<commit_message>
end of day push
</commit_message>
<xml_diff>
--- a/projects/Project 5/Project 5 Presentation.pptx
+++ b/projects/Project 5/Project 5 Presentation.pptx
@@ -248,7 +248,7 @@
           <a:p>
             <a:fld id="{7E1E4FCB-7881-414A-9FB3-AA9A4D1780F0}" type="datetimeFigureOut">
               <a:rPr lang="en-US" smtClean="0"/>
-              <a:t>10/18/16</a:t>
+              <a:t>10/19/16</a:t>
             </a:fld>
             <a:endParaRPr lang="en-US"/>
           </a:p>
@@ -418,7 +418,7 @@
           <a:p>
             <a:fld id="{7E1E4FCB-7881-414A-9FB3-AA9A4D1780F0}" type="datetimeFigureOut">
               <a:rPr lang="en-US" smtClean="0"/>
-              <a:t>10/18/16</a:t>
+              <a:t>10/19/16</a:t>
             </a:fld>
             <a:endParaRPr lang="en-US"/>
           </a:p>
@@ -598,7 +598,7 @@
           <a:p>
             <a:fld id="{7E1E4FCB-7881-414A-9FB3-AA9A4D1780F0}" type="datetimeFigureOut">
               <a:rPr lang="en-US" smtClean="0"/>
-              <a:t>10/18/16</a:t>
+              <a:t>10/19/16</a:t>
             </a:fld>
             <a:endParaRPr lang="en-US"/>
           </a:p>
@@ -768,7 +768,7 @@
           <a:p>
             <a:fld id="{7E1E4FCB-7881-414A-9FB3-AA9A4D1780F0}" type="datetimeFigureOut">
               <a:rPr lang="en-US" smtClean="0"/>
-              <a:t>10/18/16</a:t>
+              <a:t>10/19/16</a:t>
             </a:fld>
             <a:endParaRPr lang="en-US"/>
           </a:p>
@@ -1014,7 +1014,7 @@
           <a:p>
             <a:fld id="{7E1E4FCB-7881-414A-9FB3-AA9A4D1780F0}" type="datetimeFigureOut">
               <a:rPr lang="en-US" smtClean="0"/>
-              <a:t>10/18/16</a:t>
+              <a:t>10/19/16</a:t>
             </a:fld>
             <a:endParaRPr lang="en-US"/>
           </a:p>
@@ -1246,7 +1246,7 @@
           <a:p>
             <a:fld id="{7E1E4FCB-7881-414A-9FB3-AA9A4D1780F0}" type="datetimeFigureOut">
               <a:rPr lang="en-US" smtClean="0"/>
-              <a:t>10/18/16</a:t>
+              <a:t>10/19/16</a:t>
             </a:fld>
             <a:endParaRPr lang="en-US"/>
           </a:p>
@@ -1613,7 +1613,7 @@
           <a:p>
             <a:fld id="{7E1E4FCB-7881-414A-9FB3-AA9A4D1780F0}" type="datetimeFigureOut">
               <a:rPr lang="en-US" smtClean="0"/>
-              <a:t>10/18/16</a:t>
+              <a:t>10/19/16</a:t>
             </a:fld>
             <a:endParaRPr lang="en-US"/>
           </a:p>
@@ -1731,7 +1731,7 @@
           <a:p>
             <a:fld id="{7E1E4FCB-7881-414A-9FB3-AA9A4D1780F0}" type="datetimeFigureOut">
               <a:rPr lang="en-US" smtClean="0"/>
-              <a:t>10/18/16</a:t>
+              <a:t>10/19/16</a:t>
             </a:fld>
             <a:endParaRPr lang="en-US"/>
           </a:p>
@@ -1826,7 +1826,7 @@
           <a:p>
             <a:fld id="{7E1E4FCB-7881-414A-9FB3-AA9A4D1780F0}" type="datetimeFigureOut">
               <a:rPr lang="en-US" smtClean="0"/>
-              <a:t>10/18/16</a:t>
+              <a:t>10/19/16</a:t>
             </a:fld>
             <a:endParaRPr lang="en-US"/>
           </a:p>
@@ -2103,7 +2103,7 @@
           <a:p>
             <a:fld id="{7E1E4FCB-7881-414A-9FB3-AA9A4D1780F0}" type="datetimeFigureOut">
               <a:rPr lang="en-US" smtClean="0"/>
-              <a:t>10/18/16</a:t>
+              <a:t>10/19/16</a:t>
             </a:fld>
             <a:endParaRPr lang="en-US"/>
           </a:p>
@@ -2356,7 +2356,7 @@
           <a:p>
             <a:fld id="{7E1E4FCB-7881-414A-9FB3-AA9A4D1780F0}" type="datetimeFigureOut">
               <a:rPr lang="en-US" smtClean="0"/>
-              <a:t>10/18/16</a:t>
+              <a:t>10/19/16</a:t>
             </a:fld>
             <a:endParaRPr lang="en-US"/>
           </a:p>
@@ -2569,7 +2569,7 @@
           <a:p>
             <a:fld id="{7E1E4FCB-7881-414A-9FB3-AA9A4D1780F0}" type="datetimeFigureOut">
               <a:rPr lang="en-US" smtClean="0"/>
-              <a:t>10/18/16</a:t>
+              <a:t>10/19/16</a:t>
             </a:fld>
             <a:endParaRPr lang="en-US"/>
           </a:p>
@@ -3059,11 +3059,11 @@
           <a:p>
             <a:r>
               <a:rPr lang="en-US" i="1" dirty="0" smtClean="0"/>
-              <a:t>18 October </a:t>
+              <a:t>19 </a:t>
             </a:r>
             <a:r>
               <a:rPr lang="en-US" i="1" dirty="0" smtClean="0"/>
-              <a:t>2016</a:t>
+              <a:t>October 2016</a:t>
             </a:r>
             <a:endParaRPr lang="en-US" i="1" dirty="0"/>
           </a:p>
@@ -3071,27 +3071,21 @@
       </p:sp>
       <p:pic>
         <p:nvPicPr>
-          <p:cNvPr id="4" name="Picture 3"/>
+          <p:cNvPr id="7" name="Picture 6"/>
           <p:cNvPicPr>
             <a:picLocks noChangeAspect="1"/>
           </p:cNvPicPr>
           <p:nvPr/>
         </p:nvPicPr>
         <p:blipFill rotWithShape="1">
-          <a:blip r:embed="rId2">
-            <a:extLst>
-              <a:ext uri="{28A0092B-C50C-407E-A947-70E740481C1C}">
-                <a14:useLocalDpi xmlns:a14="http://schemas.microsoft.com/office/drawing/2010/main" val="0"/>
-              </a:ext>
-            </a:extLst>
-          </a:blip>
-          <a:srcRect t="23039" b="32904"/>
+          <a:blip r:embed="rId2"/>
+          <a:srcRect t="16461" b="7462"/>
           <a:stretch/>
         </p:blipFill>
         <p:spPr>
           <a:xfrm>
-            <a:off x="0" y="4789450"/>
-            <a:ext cx="12192000" cy="2202366"/>
+            <a:off x="0" y="4789449"/>
+            <a:ext cx="12192000" cy="4547432"/>
           </a:xfrm>
           <a:prstGeom prst="rect">
             <a:avLst/>
@@ -3599,11 +3593,7 @@
           <a:p>
             <a:r>
               <a:rPr lang="en-US" dirty="0" smtClean="0"/>
-              <a:t>Visualize </a:t>
-            </a:r>
-            <a:r>
-              <a:rPr lang="en-US" dirty="0" smtClean="0"/>
-              <a:t>ROC Curves for Best Models</a:t>
+              <a:t>Visualize ROC Curves for Best Models</a:t>
             </a:r>
             <a:endParaRPr lang="en-US" dirty="0"/>
           </a:p>

</xml_diff>